<commit_message>
corrected interpolation in quadrats
</commit_message>
<xml_diff>
--- a/images/trigonometry.pptx
+++ b/images/trigonometry.pptx
@@ -7,6 +7,7 @@
   <p:sldIdLst>
     <p:sldId id="256" r:id="rId2"/>
     <p:sldId id="257" r:id="rId3"/>
+    <p:sldId id="258" r:id="rId4"/>
   </p:sldIdLst>
   <p:sldSz cx="9144000" cy="6858000" type="screen4x3"/>
   <p:notesSz cx="6858000" cy="9144000"/>
@@ -244,7 +245,7 @@
           <a:p>
             <a:fld id="{58115886-84BD-4D5D-98F5-FDBDC8378FEF}" type="datetimeFigureOut">
               <a:rPr lang="en-GB" smtClean="0"/>
-              <a:t>06/12/2024</a:t>
+              <a:t>10/12/2024</a:t>
             </a:fld>
             <a:endParaRPr lang="en-GB"/>
           </a:p>
@@ -414,7 +415,7 @@
           <a:p>
             <a:fld id="{58115886-84BD-4D5D-98F5-FDBDC8378FEF}" type="datetimeFigureOut">
               <a:rPr lang="en-GB" smtClean="0"/>
-              <a:t>06/12/2024</a:t>
+              <a:t>10/12/2024</a:t>
             </a:fld>
             <a:endParaRPr lang="en-GB"/>
           </a:p>
@@ -594,7 +595,7 @@
           <a:p>
             <a:fld id="{58115886-84BD-4D5D-98F5-FDBDC8378FEF}" type="datetimeFigureOut">
               <a:rPr lang="en-GB" smtClean="0"/>
-              <a:t>06/12/2024</a:t>
+              <a:t>10/12/2024</a:t>
             </a:fld>
             <a:endParaRPr lang="en-GB"/>
           </a:p>
@@ -764,7 +765,7 @@
           <a:p>
             <a:fld id="{58115886-84BD-4D5D-98F5-FDBDC8378FEF}" type="datetimeFigureOut">
               <a:rPr lang="en-GB" smtClean="0"/>
-              <a:t>06/12/2024</a:t>
+              <a:t>10/12/2024</a:t>
             </a:fld>
             <a:endParaRPr lang="en-GB"/>
           </a:p>
@@ -1010,7 +1011,7 @@
           <a:p>
             <a:fld id="{58115886-84BD-4D5D-98F5-FDBDC8378FEF}" type="datetimeFigureOut">
               <a:rPr lang="en-GB" smtClean="0"/>
-              <a:t>06/12/2024</a:t>
+              <a:t>10/12/2024</a:t>
             </a:fld>
             <a:endParaRPr lang="en-GB"/>
           </a:p>
@@ -1242,7 +1243,7 @@
           <a:p>
             <a:fld id="{58115886-84BD-4D5D-98F5-FDBDC8378FEF}" type="datetimeFigureOut">
               <a:rPr lang="en-GB" smtClean="0"/>
-              <a:t>06/12/2024</a:t>
+              <a:t>10/12/2024</a:t>
             </a:fld>
             <a:endParaRPr lang="en-GB"/>
           </a:p>
@@ -1609,7 +1610,7 @@
           <a:p>
             <a:fld id="{58115886-84BD-4D5D-98F5-FDBDC8378FEF}" type="datetimeFigureOut">
               <a:rPr lang="en-GB" smtClean="0"/>
-              <a:t>06/12/2024</a:t>
+              <a:t>10/12/2024</a:t>
             </a:fld>
             <a:endParaRPr lang="en-GB"/>
           </a:p>
@@ -1727,7 +1728,7 @@
           <a:p>
             <a:fld id="{58115886-84BD-4D5D-98F5-FDBDC8378FEF}" type="datetimeFigureOut">
               <a:rPr lang="en-GB" smtClean="0"/>
-              <a:t>06/12/2024</a:t>
+              <a:t>10/12/2024</a:t>
             </a:fld>
             <a:endParaRPr lang="en-GB"/>
           </a:p>
@@ -1822,7 +1823,7 @@
           <a:p>
             <a:fld id="{58115886-84BD-4D5D-98F5-FDBDC8378FEF}" type="datetimeFigureOut">
               <a:rPr lang="en-GB" smtClean="0"/>
-              <a:t>06/12/2024</a:t>
+              <a:t>10/12/2024</a:t>
             </a:fld>
             <a:endParaRPr lang="en-GB"/>
           </a:p>
@@ -2099,7 +2100,7 @@
           <a:p>
             <a:fld id="{58115886-84BD-4D5D-98F5-FDBDC8378FEF}" type="datetimeFigureOut">
               <a:rPr lang="en-GB" smtClean="0"/>
-              <a:t>06/12/2024</a:t>
+              <a:t>10/12/2024</a:t>
             </a:fld>
             <a:endParaRPr lang="en-GB"/>
           </a:p>
@@ -2356,7 +2357,7 @@
           <a:p>
             <a:fld id="{58115886-84BD-4D5D-98F5-FDBDC8378FEF}" type="datetimeFigureOut">
               <a:rPr lang="en-GB" smtClean="0"/>
-              <a:t>06/12/2024</a:t>
+              <a:t>10/12/2024</a:t>
             </a:fld>
             <a:endParaRPr lang="en-GB"/>
           </a:p>
@@ -2569,7 +2570,7 @@
           <a:p>
             <a:fld id="{58115886-84BD-4D5D-98F5-FDBDC8378FEF}" type="datetimeFigureOut">
               <a:rPr lang="en-GB" smtClean="0"/>
-              <a:t>06/12/2024</a:t>
+              <a:t>10/12/2024</a:t>
             </a:fld>
             <a:endParaRPr lang="en-GB"/>
           </a:p>
@@ -4739,6 +4740,879 @@
 </p:sld>
 </file>
 
+<file path=ppt/slides/slide3.xml><?xml version="1.0" encoding="utf-8"?>
+<p:sld xmlns:a="http://schemas.openxmlformats.org/drawingml/2006/main" xmlns:r="http://schemas.openxmlformats.org/officeDocument/2006/relationships" xmlns:p="http://schemas.openxmlformats.org/presentationml/2006/main">
+  <p:cSld>
+    <p:spTree>
+      <p:nvGrpSpPr>
+        <p:cNvPr id="1" name="">
+          <a:extLst>
+            <a:ext uri="{FF2B5EF4-FFF2-40B4-BE49-F238E27FC236}">
+              <a16:creationId xmlns:a16="http://schemas.microsoft.com/office/drawing/2014/main" id="{43E2DC32-84CD-D7F9-9283-5D406B12DE7B}"/>
+            </a:ext>
+          </a:extLst>
+        </p:cNvPr>
+        <p:cNvGrpSpPr/>
+        <p:nvPr/>
+      </p:nvGrpSpPr>
+      <p:grpSpPr>
+        <a:xfrm>
+          <a:off x="0" y="0"/>
+          <a:ext cx="0" cy="0"/>
+          <a:chOff x="0" y="0"/>
+          <a:chExt cx="0" cy="0"/>
+        </a:xfrm>
+      </p:grpSpPr>
+      <p:cxnSp>
+        <p:nvCxnSpPr>
+          <p:cNvPr id="6" name="Connecteur droit avec flèche 5">
+            <a:extLst>
+              <a:ext uri="{FF2B5EF4-FFF2-40B4-BE49-F238E27FC236}">
+                <a16:creationId xmlns:a16="http://schemas.microsoft.com/office/drawing/2014/main" id="{6B8BBB1A-73B7-2113-44D4-29986DF108E9}"/>
+              </a:ext>
+            </a:extLst>
+          </p:cNvPr>
+          <p:cNvCxnSpPr>
+            <a:cxnSpLocks/>
+          </p:cNvCxnSpPr>
+          <p:nvPr/>
+        </p:nvCxnSpPr>
+        <p:spPr>
+          <a:xfrm flipH="1" flipV="1">
+            <a:off x="1389887" y="322049"/>
+            <a:ext cx="10068" cy="5900472"/>
+          </a:xfrm>
+          <a:prstGeom prst="straightConnector1">
+            <a:avLst/>
+          </a:prstGeom>
+          <a:ln>
+            <a:tailEnd type="triangle"/>
+          </a:ln>
+        </p:spPr>
+        <p:style>
+          <a:lnRef idx="2">
+            <a:schemeClr val="dk1"/>
+          </a:lnRef>
+          <a:fillRef idx="0">
+            <a:schemeClr val="dk1"/>
+          </a:fillRef>
+          <a:effectRef idx="1">
+            <a:schemeClr val="dk1"/>
+          </a:effectRef>
+          <a:fontRef idx="minor">
+            <a:schemeClr val="tx1"/>
+          </a:fontRef>
+        </p:style>
+      </p:cxnSp>
+      <p:cxnSp>
+        <p:nvCxnSpPr>
+          <p:cNvPr id="8" name="Connecteur droit avec flèche 7">
+            <a:extLst>
+              <a:ext uri="{FF2B5EF4-FFF2-40B4-BE49-F238E27FC236}">
+                <a16:creationId xmlns:a16="http://schemas.microsoft.com/office/drawing/2014/main" id="{583F2041-C224-A066-D5F7-1BC77CF930BA}"/>
+              </a:ext>
+            </a:extLst>
+          </p:cNvPr>
+          <p:cNvCxnSpPr/>
+          <p:nvPr/>
+        </p:nvCxnSpPr>
+        <p:spPr>
+          <a:xfrm>
+            <a:off x="1051560" y="5286838"/>
+            <a:ext cx="7479792" cy="0"/>
+          </a:xfrm>
+          <a:prstGeom prst="straightConnector1">
+            <a:avLst/>
+          </a:prstGeom>
+          <a:ln>
+            <a:tailEnd type="triangle"/>
+          </a:ln>
+        </p:spPr>
+        <p:style>
+          <a:lnRef idx="2">
+            <a:schemeClr val="accent1"/>
+          </a:lnRef>
+          <a:fillRef idx="0">
+            <a:schemeClr val="accent1"/>
+          </a:fillRef>
+          <a:effectRef idx="1">
+            <a:schemeClr val="accent1"/>
+          </a:effectRef>
+          <a:fontRef idx="minor">
+            <a:schemeClr val="tx1"/>
+          </a:fontRef>
+        </p:style>
+      </p:cxnSp>
+      <p:cxnSp>
+        <p:nvCxnSpPr>
+          <p:cNvPr id="12" name="Connecteur droit 11">
+            <a:extLst>
+              <a:ext uri="{FF2B5EF4-FFF2-40B4-BE49-F238E27FC236}">
+                <a16:creationId xmlns:a16="http://schemas.microsoft.com/office/drawing/2014/main" id="{0087BCBB-7AEC-9FD6-BDB7-006890EBBF28}"/>
+              </a:ext>
+            </a:extLst>
+          </p:cNvPr>
+          <p:cNvCxnSpPr>
+            <a:cxnSpLocks/>
+          </p:cNvCxnSpPr>
+          <p:nvPr/>
+        </p:nvCxnSpPr>
+        <p:spPr>
+          <a:xfrm flipV="1">
+            <a:off x="845389" y="1364062"/>
+            <a:ext cx="6826427" cy="211692"/>
+          </a:xfrm>
+          <a:prstGeom prst="line">
+            <a:avLst/>
+          </a:prstGeom>
+          <a:ln w="38100"/>
+        </p:spPr>
+        <p:style>
+          <a:lnRef idx="2">
+            <a:schemeClr val="accent1"/>
+          </a:lnRef>
+          <a:fillRef idx="0">
+            <a:schemeClr val="accent1"/>
+          </a:fillRef>
+          <a:effectRef idx="1">
+            <a:schemeClr val="accent1"/>
+          </a:effectRef>
+          <a:fontRef idx="minor">
+            <a:schemeClr val="tx1"/>
+          </a:fontRef>
+        </p:style>
+      </p:cxnSp>
+      <p:cxnSp>
+        <p:nvCxnSpPr>
+          <p:cNvPr id="14" name="Connecteur droit 13">
+            <a:extLst>
+              <a:ext uri="{FF2B5EF4-FFF2-40B4-BE49-F238E27FC236}">
+                <a16:creationId xmlns:a16="http://schemas.microsoft.com/office/drawing/2014/main" id="{2953F806-4530-45AF-AB59-456887D95317}"/>
+              </a:ext>
+            </a:extLst>
+          </p:cNvPr>
+          <p:cNvCxnSpPr>
+            <a:cxnSpLocks/>
+          </p:cNvCxnSpPr>
+          <p:nvPr/>
+        </p:nvCxnSpPr>
+        <p:spPr>
+          <a:xfrm flipH="1">
+            <a:off x="6119004" y="1364062"/>
+            <a:ext cx="1552812" cy="4478892"/>
+          </a:xfrm>
+          <a:prstGeom prst="line">
+            <a:avLst/>
+          </a:prstGeom>
+          <a:ln w="38100"/>
+        </p:spPr>
+        <p:style>
+          <a:lnRef idx="2">
+            <a:schemeClr val="accent1"/>
+          </a:lnRef>
+          <a:fillRef idx="0">
+            <a:schemeClr val="accent1"/>
+          </a:fillRef>
+          <a:effectRef idx="1">
+            <a:schemeClr val="accent1"/>
+          </a:effectRef>
+          <a:fontRef idx="minor">
+            <a:schemeClr val="tx1"/>
+          </a:fontRef>
+        </p:style>
+      </p:cxnSp>
+      <p:cxnSp>
+        <p:nvCxnSpPr>
+          <p:cNvPr id="16" name="Connecteur droit 15">
+            <a:extLst>
+              <a:ext uri="{FF2B5EF4-FFF2-40B4-BE49-F238E27FC236}">
+                <a16:creationId xmlns:a16="http://schemas.microsoft.com/office/drawing/2014/main" id="{BBE82BFC-C9C4-793B-F877-6AEAC729AA2C}"/>
+              </a:ext>
+            </a:extLst>
+          </p:cNvPr>
+          <p:cNvCxnSpPr>
+            <a:cxnSpLocks/>
+          </p:cNvCxnSpPr>
+          <p:nvPr/>
+        </p:nvCxnSpPr>
+        <p:spPr>
+          <a:xfrm flipH="1" flipV="1">
+            <a:off x="1161288" y="1281767"/>
+            <a:ext cx="6601968" cy="82295"/>
+          </a:xfrm>
+          <a:prstGeom prst="line">
+            <a:avLst/>
+          </a:prstGeom>
+          <a:ln>
+            <a:prstDash val="dash"/>
+          </a:ln>
+        </p:spPr>
+        <p:style>
+          <a:lnRef idx="2">
+            <a:schemeClr val="dk1"/>
+          </a:lnRef>
+          <a:fillRef idx="0">
+            <a:schemeClr val="dk1"/>
+          </a:fillRef>
+          <a:effectRef idx="1">
+            <a:schemeClr val="dk1"/>
+          </a:effectRef>
+          <a:fontRef idx="minor">
+            <a:schemeClr val="tx1"/>
+          </a:fontRef>
+        </p:style>
+      </p:cxnSp>
+      <p:cxnSp>
+        <p:nvCxnSpPr>
+          <p:cNvPr id="18" name="Connecteur droit 17">
+            <a:extLst>
+              <a:ext uri="{FF2B5EF4-FFF2-40B4-BE49-F238E27FC236}">
+                <a16:creationId xmlns:a16="http://schemas.microsoft.com/office/drawing/2014/main" id="{9B368BAB-4E44-3DAD-E627-7DD76720027A}"/>
+              </a:ext>
+            </a:extLst>
+          </p:cNvPr>
+          <p:cNvCxnSpPr>
+            <a:cxnSpLocks/>
+          </p:cNvCxnSpPr>
+          <p:nvPr/>
+        </p:nvCxnSpPr>
+        <p:spPr>
+          <a:xfrm flipH="1" flipV="1">
+            <a:off x="7671816" y="1089743"/>
+            <a:ext cx="20137" cy="4960249"/>
+          </a:xfrm>
+          <a:prstGeom prst="line">
+            <a:avLst/>
+          </a:prstGeom>
+          <a:ln>
+            <a:prstDash val="dash"/>
+          </a:ln>
+        </p:spPr>
+        <p:style>
+          <a:lnRef idx="2">
+            <a:schemeClr val="dk1"/>
+          </a:lnRef>
+          <a:fillRef idx="0">
+            <a:schemeClr val="dk1"/>
+          </a:fillRef>
+          <a:effectRef idx="1">
+            <a:schemeClr val="dk1"/>
+          </a:effectRef>
+          <a:fontRef idx="minor">
+            <a:schemeClr val="tx1"/>
+          </a:fontRef>
+        </p:style>
+      </p:cxnSp>
+      <p:sp>
+        <p:nvSpPr>
+          <p:cNvPr id="21" name="Rectangle 20">
+            <a:extLst>
+              <a:ext uri="{FF2B5EF4-FFF2-40B4-BE49-F238E27FC236}">
+                <a16:creationId xmlns:a16="http://schemas.microsoft.com/office/drawing/2014/main" id="{D1D27F85-F0B2-8342-9508-A272F599C92E}"/>
+              </a:ext>
+            </a:extLst>
+          </p:cNvPr>
+          <p:cNvSpPr/>
+          <p:nvPr/>
+        </p:nvSpPr>
+        <p:spPr>
+          <a:xfrm>
+            <a:off x="1389889" y="5113107"/>
+            <a:ext cx="155436" cy="173725"/>
+          </a:xfrm>
+          <a:prstGeom prst="rect">
+            <a:avLst/>
+          </a:prstGeom>
+          <a:noFill/>
+        </p:spPr>
+        <p:style>
+          <a:lnRef idx="2">
+            <a:schemeClr val="accent1">
+              <a:shade val="15000"/>
+            </a:schemeClr>
+          </a:lnRef>
+          <a:fillRef idx="1">
+            <a:schemeClr val="accent1"/>
+          </a:fillRef>
+          <a:effectRef idx="0">
+            <a:schemeClr val="accent1"/>
+          </a:effectRef>
+          <a:fontRef idx="minor">
+            <a:schemeClr val="lt1"/>
+          </a:fontRef>
+        </p:style>
+        <p:txBody>
+          <a:bodyPr rtlCol="0" anchor="ctr"/>
+          <a:lstStyle/>
+          <a:p>
+            <a:pPr algn="ctr"/>
+            <a:endParaRPr lang="en-GB"/>
+          </a:p>
+        </p:txBody>
+      </p:sp>
+      <p:sp>
+        <p:nvSpPr>
+          <p:cNvPr id="22" name="ZoneTexte 21">
+            <a:extLst>
+              <a:ext uri="{FF2B5EF4-FFF2-40B4-BE49-F238E27FC236}">
+                <a16:creationId xmlns:a16="http://schemas.microsoft.com/office/drawing/2014/main" id="{19F3276C-772F-6CF7-BDBC-3EBA1E01456A}"/>
+              </a:ext>
+            </a:extLst>
+          </p:cNvPr>
+          <p:cNvSpPr txBox="1"/>
+          <p:nvPr/>
+        </p:nvSpPr>
+        <p:spPr>
+          <a:xfrm>
+            <a:off x="689330" y="404778"/>
+            <a:ext cx="700557" cy="300082"/>
+          </a:xfrm>
+          <a:prstGeom prst="rect">
+            <a:avLst/>
+          </a:prstGeom>
+          <a:noFill/>
+        </p:spPr>
+        <p:txBody>
+          <a:bodyPr wrap="square" rtlCol="0">
+            <a:spAutoFit/>
+          </a:bodyPr>
+          <a:lstStyle/>
+          <a:p>
+            <a:r>
+              <a:rPr lang="en-GB" sz="1350" dirty="0"/>
+              <a:t>up-left</a:t>
+            </a:r>
+          </a:p>
+        </p:txBody>
+      </p:sp>
+      <p:sp>
+        <p:nvSpPr>
+          <p:cNvPr id="23" name="ZoneTexte 22">
+            <a:extLst>
+              <a:ext uri="{FF2B5EF4-FFF2-40B4-BE49-F238E27FC236}">
+                <a16:creationId xmlns:a16="http://schemas.microsoft.com/office/drawing/2014/main" id="{81B1CCFE-1B10-6878-6A4A-379B59D8A35B}"/>
+              </a:ext>
+            </a:extLst>
+          </p:cNvPr>
+          <p:cNvSpPr txBox="1"/>
+          <p:nvPr/>
+        </p:nvSpPr>
+        <p:spPr>
+          <a:xfrm>
+            <a:off x="517519" y="5286832"/>
+            <a:ext cx="1068081" cy="300082"/>
+          </a:xfrm>
+          <a:prstGeom prst="rect">
+            <a:avLst/>
+          </a:prstGeom>
+          <a:noFill/>
+        </p:spPr>
+        <p:txBody>
+          <a:bodyPr wrap="square" rtlCol="0">
+            <a:spAutoFit/>
+          </a:bodyPr>
+          <a:lstStyle/>
+          <a:p>
+            <a:r>
+              <a:rPr lang="en-GB" sz="1350" dirty="0"/>
+              <a:t>down-left</a:t>
+            </a:r>
+          </a:p>
+        </p:txBody>
+      </p:sp>
+      <p:sp>
+        <p:nvSpPr>
+          <p:cNvPr id="24" name="ZoneTexte 23">
+            <a:extLst>
+              <a:ext uri="{FF2B5EF4-FFF2-40B4-BE49-F238E27FC236}">
+                <a16:creationId xmlns:a16="http://schemas.microsoft.com/office/drawing/2014/main" id="{B50B0234-F656-E782-E037-358B01324A70}"/>
+              </a:ext>
+            </a:extLst>
+          </p:cNvPr>
+          <p:cNvSpPr txBox="1"/>
+          <p:nvPr/>
+        </p:nvSpPr>
+        <p:spPr>
+          <a:xfrm>
+            <a:off x="7631551" y="1073956"/>
+            <a:ext cx="872369" cy="300082"/>
+          </a:xfrm>
+          <a:prstGeom prst="rect">
+            <a:avLst/>
+          </a:prstGeom>
+          <a:noFill/>
+        </p:spPr>
+        <p:txBody>
+          <a:bodyPr wrap="square" rtlCol="0">
+            <a:spAutoFit/>
+          </a:bodyPr>
+          <a:lstStyle/>
+          <a:p>
+            <a:r>
+              <a:rPr lang="en-GB" sz="1350" dirty="0"/>
+              <a:t>up-right</a:t>
+            </a:r>
+          </a:p>
+        </p:txBody>
+      </p:sp>
+      <p:sp>
+        <p:nvSpPr>
+          <p:cNvPr id="25" name="ZoneTexte 24">
+            <a:extLst>
+              <a:ext uri="{FF2B5EF4-FFF2-40B4-BE49-F238E27FC236}">
+                <a16:creationId xmlns:a16="http://schemas.microsoft.com/office/drawing/2014/main" id="{12E6D47B-FCA9-D754-C99D-39BB68BC264D}"/>
+              </a:ext>
+            </a:extLst>
+          </p:cNvPr>
+          <p:cNvSpPr txBox="1"/>
+          <p:nvPr/>
+        </p:nvSpPr>
+        <p:spPr>
+          <a:xfrm>
+            <a:off x="6362966" y="5336898"/>
+            <a:ext cx="1068080" cy="300082"/>
+          </a:xfrm>
+          <a:prstGeom prst="rect">
+            <a:avLst/>
+          </a:prstGeom>
+          <a:noFill/>
+        </p:spPr>
+        <p:txBody>
+          <a:bodyPr wrap="square" rtlCol="0">
+            <a:spAutoFit/>
+          </a:bodyPr>
+          <a:lstStyle/>
+          <a:p>
+            <a:r>
+              <a:rPr lang="en-GB" sz="1350" dirty="0"/>
+              <a:t>down-right</a:t>
+            </a:r>
+          </a:p>
+        </p:txBody>
+      </p:sp>
+      <p:sp>
+        <p:nvSpPr>
+          <p:cNvPr id="26" name="ZoneTexte 25">
+            <a:extLst>
+              <a:ext uri="{FF2B5EF4-FFF2-40B4-BE49-F238E27FC236}">
+                <a16:creationId xmlns:a16="http://schemas.microsoft.com/office/drawing/2014/main" id="{D84C3E35-46A8-C53C-3E80-FA033AC886BF}"/>
+              </a:ext>
+            </a:extLst>
+          </p:cNvPr>
+          <p:cNvSpPr txBox="1"/>
+          <p:nvPr/>
+        </p:nvSpPr>
+        <p:spPr>
+          <a:xfrm>
+            <a:off x="7754112" y="5340467"/>
+            <a:ext cx="872369" cy="300082"/>
+          </a:xfrm>
+          <a:prstGeom prst="rect">
+            <a:avLst/>
+          </a:prstGeom>
+          <a:noFill/>
+        </p:spPr>
+        <p:txBody>
+          <a:bodyPr wrap="square" rtlCol="0">
+            <a:spAutoFit/>
+          </a:bodyPr>
+          <a:lstStyle/>
+          <a:p>
+            <a:r>
+              <a:rPr lang="en-GB" sz="1350" dirty="0" err="1"/>
+              <a:t>x</a:t>
+            </a:r>
+            <a:r>
+              <a:rPr lang="en-GB" sz="1350" baseline="-25000" dirty="0" err="1"/>
+              <a:t>up</a:t>
+            </a:r>
+            <a:r>
+              <a:rPr lang="en-GB" sz="1350" baseline="-25000" dirty="0"/>
+              <a:t>-right</a:t>
+            </a:r>
+          </a:p>
+        </p:txBody>
+      </p:sp>
+      <p:sp>
+        <p:nvSpPr>
+          <p:cNvPr id="27" name="ZoneTexte 26">
+            <a:extLst>
+              <a:ext uri="{FF2B5EF4-FFF2-40B4-BE49-F238E27FC236}">
+                <a16:creationId xmlns:a16="http://schemas.microsoft.com/office/drawing/2014/main" id="{30C525D0-61AF-9660-4044-DFF392557685}"/>
+              </a:ext>
+            </a:extLst>
+          </p:cNvPr>
+          <p:cNvSpPr txBox="1"/>
+          <p:nvPr/>
+        </p:nvSpPr>
+        <p:spPr>
+          <a:xfrm>
+            <a:off x="693019" y="1172873"/>
+            <a:ext cx="872369" cy="300082"/>
+          </a:xfrm>
+          <a:prstGeom prst="rect">
+            <a:avLst/>
+          </a:prstGeom>
+          <a:noFill/>
+        </p:spPr>
+        <p:txBody>
+          <a:bodyPr wrap="square" rtlCol="0">
+            <a:spAutoFit/>
+          </a:bodyPr>
+          <a:lstStyle/>
+          <a:p>
+            <a:r>
+              <a:rPr lang="en-GB" sz="1350" dirty="0"/>
+              <a:t>y</a:t>
+            </a:r>
+            <a:r>
+              <a:rPr lang="en-GB" sz="1350" baseline="-25000" dirty="0"/>
+              <a:t>up-right</a:t>
+            </a:r>
+          </a:p>
+        </p:txBody>
+      </p:sp>
+      <p:cxnSp>
+        <p:nvCxnSpPr>
+          <p:cNvPr id="7" name="Connecteur droit 6">
+            <a:extLst>
+              <a:ext uri="{FF2B5EF4-FFF2-40B4-BE49-F238E27FC236}">
+                <a16:creationId xmlns:a16="http://schemas.microsoft.com/office/drawing/2014/main" id="{2FC54932-4C65-5626-5471-BD5988AB1C9D}"/>
+              </a:ext>
+            </a:extLst>
+          </p:cNvPr>
+          <p:cNvCxnSpPr>
+            <a:cxnSpLocks/>
+          </p:cNvCxnSpPr>
+          <p:nvPr/>
+        </p:nvCxnSpPr>
+        <p:spPr>
+          <a:xfrm>
+            <a:off x="1389887" y="5286832"/>
+            <a:ext cx="4729116" cy="556403"/>
+          </a:xfrm>
+          <a:prstGeom prst="line">
+            <a:avLst/>
+          </a:prstGeom>
+          <a:ln w="38100"/>
+        </p:spPr>
+        <p:style>
+          <a:lnRef idx="2">
+            <a:schemeClr val="accent1"/>
+          </a:lnRef>
+          <a:fillRef idx="0">
+            <a:schemeClr val="accent1"/>
+          </a:fillRef>
+          <a:effectRef idx="1">
+            <a:schemeClr val="accent1"/>
+          </a:effectRef>
+          <a:fontRef idx="minor">
+            <a:schemeClr val="tx1"/>
+          </a:fontRef>
+        </p:style>
+      </p:cxnSp>
+      <p:cxnSp>
+        <p:nvCxnSpPr>
+          <p:cNvPr id="10" name="Connecteur droit 9">
+            <a:extLst>
+              <a:ext uri="{FF2B5EF4-FFF2-40B4-BE49-F238E27FC236}">
+                <a16:creationId xmlns:a16="http://schemas.microsoft.com/office/drawing/2014/main" id="{047DF9B9-35AF-BE67-1868-B24AE0214B4B}"/>
+              </a:ext>
+            </a:extLst>
+          </p:cNvPr>
+          <p:cNvCxnSpPr>
+            <a:cxnSpLocks/>
+          </p:cNvCxnSpPr>
+          <p:nvPr/>
+        </p:nvCxnSpPr>
+        <p:spPr>
+          <a:xfrm>
+            <a:off x="845388" y="1571873"/>
+            <a:ext cx="544499" cy="3715523"/>
+          </a:xfrm>
+          <a:prstGeom prst="line">
+            <a:avLst/>
+          </a:prstGeom>
+          <a:ln w="38100"/>
+        </p:spPr>
+        <p:style>
+          <a:lnRef idx="2">
+            <a:schemeClr val="accent1"/>
+          </a:lnRef>
+          <a:fillRef idx="0">
+            <a:schemeClr val="accent1"/>
+          </a:fillRef>
+          <a:effectRef idx="1">
+            <a:schemeClr val="accent1"/>
+          </a:effectRef>
+          <a:fontRef idx="minor">
+            <a:schemeClr val="tx1"/>
+          </a:fontRef>
+        </p:style>
+      </p:cxnSp>
+      <p:cxnSp>
+        <p:nvCxnSpPr>
+          <p:cNvPr id="20" name="Connecteur droit 19">
+            <a:extLst>
+              <a:ext uri="{FF2B5EF4-FFF2-40B4-BE49-F238E27FC236}">
+                <a16:creationId xmlns:a16="http://schemas.microsoft.com/office/drawing/2014/main" id="{40C2E43E-D544-D37A-F7E3-B4C27407AC38}"/>
+              </a:ext>
+            </a:extLst>
+          </p:cNvPr>
+          <p:cNvCxnSpPr>
+            <a:cxnSpLocks/>
+          </p:cNvCxnSpPr>
+          <p:nvPr/>
+        </p:nvCxnSpPr>
+        <p:spPr>
+          <a:xfrm flipH="1" flipV="1">
+            <a:off x="1234902" y="5823824"/>
+            <a:ext cx="4863965" cy="19689"/>
+          </a:xfrm>
+          <a:prstGeom prst="line">
+            <a:avLst/>
+          </a:prstGeom>
+          <a:ln>
+            <a:prstDash val="dash"/>
+          </a:ln>
+        </p:spPr>
+        <p:style>
+          <a:lnRef idx="2">
+            <a:schemeClr val="dk1"/>
+          </a:lnRef>
+          <a:fillRef idx="0">
+            <a:schemeClr val="dk1"/>
+          </a:fillRef>
+          <a:effectRef idx="1">
+            <a:schemeClr val="dk1"/>
+          </a:effectRef>
+          <a:fontRef idx="minor">
+            <a:schemeClr val="tx1"/>
+          </a:fontRef>
+        </p:style>
+      </p:cxnSp>
+      <p:cxnSp>
+        <p:nvCxnSpPr>
+          <p:cNvPr id="29" name="Connecteur droit 28">
+            <a:extLst>
+              <a:ext uri="{FF2B5EF4-FFF2-40B4-BE49-F238E27FC236}">
+                <a16:creationId xmlns:a16="http://schemas.microsoft.com/office/drawing/2014/main" id="{0E552EA4-3589-847E-999B-9806D4BD3F54}"/>
+              </a:ext>
+            </a:extLst>
+          </p:cNvPr>
+          <p:cNvCxnSpPr>
+            <a:cxnSpLocks/>
+          </p:cNvCxnSpPr>
+          <p:nvPr/>
+        </p:nvCxnSpPr>
+        <p:spPr>
+          <a:xfrm flipV="1">
+            <a:off x="6119003" y="4784785"/>
+            <a:ext cx="10069" cy="1009327"/>
+          </a:xfrm>
+          <a:prstGeom prst="line">
+            <a:avLst/>
+          </a:prstGeom>
+          <a:ln>
+            <a:prstDash val="dash"/>
+          </a:ln>
+        </p:spPr>
+        <p:style>
+          <a:lnRef idx="2">
+            <a:schemeClr val="dk1"/>
+          </a:lnRef>
+          <a:fillRef idx="0">
+            <a:schemeClr val="dk1"/>
+          </a:fillRef>
+          <a:effectRef idx="1">
+            <a:schemeClr val="dk1"/>
+          </a:effectRef>
+          <a:fontRef idx="minor">
+            <a:schemeClr val="tx1"/>
+          </a:fontRef>
+        </p:style>
+      </p:cxnSp>
+      <p:sp>
+        <p:nvSpPr>
+          <p:cNvPr id="32" name="ZoneTexte 31">
+            <a:extLst>
+              <a:ext uri="{FF2B5EF4-FFF2-40B4-BE49-F238E27FC236}">
+                <a16:creationId xmlns:a16="http://schemas.microsoft.com/office/drawing/2014/main" id="{CCCD2541-ED9B-C4C8-D864-1C53F5D2CFA0}"/>
+              </a:ext>
+            </a:extLst>
+          </p:cNvPr>
+          <p:cNvSpPr txBox="1"/>
+          <p:nvPr/>
+        </p:nvSpPr>
+        <p:spPr>
+          <a:xfrm>
+            <a:off x="5307037" y="4907824"/>
+            <a:ext cx="872369" cy="300082"/>
+          </a:xfrm>
+          <a:prstGeom prst="rect">
+            <a:avLst/>
+          </a:prstGeom>
+          <a:noFill/>
+        </p:spPr>
+        <p:txBody>
+          <a:bodyPr wrap="square" rtlCol="0">
+            <a:spAutoFit/>
+          </a:bodyPr>
+          <a:lstStyle/>
+          <a:p>
+            <a:r>
+              <a:rPr lang="en-GB" sz="1350" dirty="0" err="1"/>
+              <a:t>x</a:t>
+            </a:r>
+            <a:r>
+              <a:rPr lang="en-GB" sz="1350" baseline="-25000" dirty="0" err="1"/>
+              <a:t>down</a:t>
+            </a:r>
+            <a:r>
+              <a:rPr lang="en-GB" sz="1350" baseline="-25000" dirty="0"/>
+              <a:t>-right</a:t>
+            </a:r>
+          </a:p>
+        </p:txBody>
+      </p:sp>
+      <p:sp>
+        <p:nvSpPr>
+          <p:cNvPr id="33" name="ZoneTexte 32">
+            <a:extLst>
+              <a:ext uri="{FF2B5EF4-FFF2-40B4-BE49-F238E27FC236}">
+                <a16:creationId xmlns:a16="http://schemas.microsoft.com/office/drawing/2014/main" id="{D484F003-BF7A-B51B-B2B7-AD4DDCDAD835}"/>
+              </a:ext>
+            </a:extLst>
+          </p:cNvPr>
+          <p:cNvSpPr txBox="1"/>
+          <p:nvPr/>
+        </p:nvSpPr>
+        <p:spPr>
+          <a:xfrm>
+            <a:off x="652019" y="5749910"/>
+            <a:ext cx="872369" cy="300082"/>
+          </a:xfrm>
+          <a:prstGeom prst="rect">
+            <a:avLst/>
+          </a:prstGeom>
+          <a:noFill/>
+        </p:spPr>
+        <p:txBody>
+          <a:bodyPr wrap="square" rtlCol="0">
+            <a:spAutoFit/>
+          </a:bodyPr>
+          <a:lstStyle/>
+          <a:p>
+            <a:r>
+              <a:rPr lang="en-GB" sz="1350" dirty="0" err="1"/>
+              <a:t>y</a:t>
+            </a:r>
+            <a:r>
+              <a:rPr lang="en-GB" sz="1350" baseline="-25000" dirty="0" err="1"/>
+              <a:t>down</a:t>
+            </a:r>
+            <a:r>
+              <a:rPr lang="en-GB" sz="1350" baseline="-25000" dirty="0"/>
+              <a:t>-right</a:t>
+            </a:r>
+          </a:p>
+        </p:txBody>
+      </p:sp>
+      <p:cxnSp>
+        <p:nvCxnSpPr>
+          <p:cNvPr id="35" name="Connecteur droit avec flèche 34">
+            <a:extLst>
+              <a:ext uri="{FF2B5EF4-FFF2-40B4-BE49-F238E27FC236}">
+                <a16:creationId xmlns:a16="http://schemas.microsoft.com/office/drawing/2014/main" id="{34A49CDA-5E09-701D-CC3E-7D09627EB514}"/>
+              </a:ext>
+            </a:extLst>
+          </p:cNvPr>
+          <p:cNvCxnSpPr>
+            <a:cxnSpLocks/>
+          </p:cNvCxnSpPr>
+          <p:nvPr/>
+        </p:nvCxnSpPr>
+        <p:spPr>
+          <a:xfrm>
+            <a:off x="1039608" y="2951350"/>
+            <a:ext cx="6085811" cy="0"/>
+          </a:xfrm>
+          <a:prstGeom prst="straightConnector1">
+            <a:avLst/>
+          </a:prstGeom>
+          <a:ln>
+            <a:headEnd type="triangle" w="lg" len="lg"/>
+            <a:tailEnd type="triangle" w="lg" len="lg"/>
+          </a:ln>
+        </p:spPr>
+        <p:style>
+          <a:lnRef idx="1">
+            <a:schemeClr val="accent2"/>
+          </a:lnRef>
+          <a:fillRef idx="0">
+            <a:schemeClr val="accent2"/>
+          </a:fillRef>
+          <a:effectRef idx="0">
+            <a:schemeClr val="accent2"/>
+          </a:effectRef>
+          <a:fontRef idx="minor">
+            <a:schemeClr val="tx1"/>
+          </a:fontRef>
+        </p:style>
+      </p:cxnSp>
+      <p:sp>
+        <p:nvSpPr>
+          <p:cNvPr id="38" name="ZoneTexte 37">
+            <a:extLst>
+              <a:ext uri="{FF2B5EF4-FFF2-40B4-BE49-F238E27FC236}">
+                <a16:creationId xmlns:a16="http://schemas.microsoft.com/office/drawing/2014/main" id="{786C9BF8-73E0-E9BD-9996-3D138DCE3FC4}"/>
+              </a:ext>
+            </a:extLst>
+          </p:cNvPr>
+          <p:cNvSpPr txBox="1"/>
+          <p:nvPr/>
+        </p:nvSpPr>
+        <p:spPr>
+          <a:xfrm>
+            <a:off x="3376740" y="2614955"/>
+            <a:ext cx="872369" cy="300082"/>
+          </a:xfrm>
+          <a:prstGeom prst="rect">
+            <a:avLst/>
+          </a:prstGeom>
+          <a:noFill/>
+        </p:spPr>
+        <p:txBody>
+          <a:bodyPr wrap="square" rtlCol="0">
+            <a:spAutoFit/>
+          </a:bodyPr>
+          <a:lstStyle/>
+          <a:p>
+            <a:r>
+              <a:rPr lang="en-GB" sz="1350" dirty="0" err="1"/>
+              <a:t>x</a:t>
+            </a:r>
+            <a:r>
+              <a:rPr lang="en-GB" sz="1350" baseline="-25000" dirty="0" err="1"/>
+              <a:t>max</a:t>
+            </a:r>
+            <a:endParaRPr lang="en-GB" sz="1350" dirty="0"/>
+          </a:p>
+        </p:txBody>
+      </p:sp>
+    </p:spTree>
+    <p:extLst>
+      <p:ext uri="{BB962C8B-B14F-4D97-AF65-F5344CB8AC3E}">
+        <p14:creationId xmlns:p14="http://schemas.microsoft.com/office/powerpoint/2010/main" val="3183590326"/>
+      </p:ext>
+    </p:extLst>
+  </p:cSld>
+  <p:clrMapOvr>
+    <a:masterClrMapping/>
+  </p:clrMapOvr>
+</p:sld>
+</file>
+
 <file path=ppt/theme/theme1.xml><?xml version="1.0" encoding="utf-8"?>
 <a:theme xmlns:a="http://schemas.openxmlformats.org/drawingml/2006/main" name="Thème Office">
   <a:themeElements>

</xml_diff>

<commit_message>
corrected the interpolation of tree coords
</commit_message>
<xml_diff>
--- a/images/trigonometry.pptx
+++ b/images/trigonometry.pptx
@@ -245,7 +245,7 @@
           <a:p>
             <a:fld id="{58115886-84BD-4D5D-98F5-FDBDC8378FEF}" type="datetimeFigureOut">
               <a:rPr lang="en-GB" smtClean="0"/>
-              <a:t>13/12/2024</a:t>
+              <a:t>14/01/2025</a:t>
             </a:fld>
             <a:endParaRPr lang="en-GB"/>
           </a:p>
@@ -415,7 +415,7 @@
           <a:p>
             <a:fld id="{58115886-84BD-4D5D-98F5-FDBDC8378FEF}" type="datetimeFigureOut">
               <a:rPr lang="en-GB" smtClean="0"/>
-              <a:t>13/12/2024</a:t>
+              <a:t>14/01/2025</a:t>
             </a:fld>
             <a:endParaRPr lang="en-GB"/>
           </a:p>
@@ -595,7 +595,7 @@
           <a:p>
             <a:fld id="{58115886-84BD-4D5D-98F5-FDBDC8378FEF}" type="datetimeFigureOut">
               <a:rPr lang="en-GB" smtClean="0"/>
-              <a:t>13/12/2024</a:t>
+              <a:t>14/01/2025</a:t>
             </a:fld>
             <a:endParaRPr lang="en-GB"/>
           </a:p>
@@ -765,7 +765,7 @@
           <a:p>
             <a:fld id="{58115886-84BD-4D5D-98F5-FDBDC8378FEF}" type="datetimeFigureOut">
               <a:rPr lang="en-GB" smtClean="0"/>
-              <a:t>13/12/2024</a:t>
+              <a:t>14/01/2025</a:t>
             </a:fld>
             <a:endParaRPr lang="en-GB"/>
           </a:p>
@@ -1011,7 +1011,7 @@
           <a:p>
             <a:fld id="{58115886-84BD-4D5D-98F5-FDBDC8378FEF}" type="datetimeFigureOut">
               <a:rPr lang="en-GB" smtClean="0"/>
-              <a:t>13/12/2024</a:t>
+              <a:t>14/01/2025</a:t>
             </a:fld>
             <a:endParaRPr lang="en-GB"/>
           </a:p>
@@ -1243,7 +1243,7 @@
           <a:p>
             <a:fld id="{58115886-84BD-4D5D-98F5-FDBDC8378FEF}" type="datetimeFigureOut">
               <a:rPr lang="en-GB" smtClean="0"/>
-              <a:t>13/12/2024</a:t>
+              <a:t>14/01/2025</a:t>
             </a:fld>
             <a:endParaRPr lang="en-GB"/>
           </a:p>
@@ -1610,7 +1610,7 @@
           <a:p>
             <a:fld id="{58115886-84BD-4D5D-98F5-FDBDC8378FEF}" type="datetimeFigureOut">
               <a:rPr lang="en-GB" smtClean="0"/>
-              <a:t>13/12/2024</a:t>
+              <a:t>14/01/2025</a:t>
             </a:fld>
             <a:endParaRPr lang="en-GB"/>
           </a:p>
@@ -1728,7 +1728,7 @@
           <a:p>
             <a:fld id="{58115886-84BD-4D5D-98F5-FDBDC8378FEF}" type="datetimeFigureOut">
               <a:rPr lang="en-GB" smtClean="0"/>
-              <a:t>13/12/2024</a:t>
+              <a:t>14/01/2025</a:t>
             </a:fld>
             <a:endParaRPr lang="en-GB"/>
           </a:p>
@@ -1823,7 +1823,7 @@
           <a:p>
             <a:fld id="{58115886-84BD-4D5D-98F5-FDBDC8378FEF}" type="datetimeFigureOut">
               <a:rPr lang="en-GB" smtClean="0"/>
-              <a:t>13/12/2024</a:t>
+              <a:t>14/01/2025</a:t>
             </a:fld>
             <a:endParaRPr lang="en-GB"/>
           </a:p>
@@ -2100,7 +2100,7 @@
           <a:p>
             <a:fld id="{58115886-84BD-4D5D-98F5-FDBDC8378FEF}" type="datetimeFigureOut">
               <a:rPr lang="en-GB" smtClean="0"/>
-              <a:t>13/12/2024</a:t>
+              <a:t>14/01/2025</a:t>
             </a:fld>
             <a:endParaRPr lang="en-GB"/>
           </a:p>
@@ -2357,7 +2357,7 @@
           <a:p>
             <a:fld id="{58115886-84BD-4D5D-98F5-FDBDC8378FEF}" type="datetimeFigureOut">
               <a:rPr lang="en-GB" smtClean="0"/>
-              <a:t>13/12/2024</a:t>
+              <a:t>14/01/2025</a:t>
             </a:fld>
             <a:endParaRPr lang="en-GB"/>
           </a:p>
@@ -2570,7 +2570,7 @@
           <a:p>
             <a:fld id="{58115886-84BD-4D5D-98F5-FDBDC8378FEF}" type="datetimeFigureOut">
               <a:rPr lang="en-GB" smtClean="0"/>
-              <a:t>13/12/2024</a:t>
+              <a:t>14/01/2025</a:t>
             </a:fld>
             <a:endParaRPr lang="en-GB"/>
           </a:p>
@@ -5323,9 +5323,9 @@
           <p:nvPr/>
         </p:nvCxnSpPr>
         <p:spPr>
-          <a:xfrm flipV="1">
-            <a:off x="845389" y="1364062"/>
-            <a:ext cx="6826427" cy="211692"/>
+          <a:xfrm>
+            <a:off x="731752" y="671885"/>
+            <a:ext cx="7481945" cy="743447"/>
           </a:xfrm>
           <a:prstGeom prst="line">
             <a:avLst/>
@@ -5363,8 +5363,8 @@
         </p:nvCxnSpPr>
         <p:spPr>
           <a:xfrm flipH="1">
-            <a:off x="6119004" y="1364062"/>
-            <a:ext cx="1552812" cy="4478892"/>
+            <a:off x="7717226" y="1415332"/>
+            <a:ext cx="496471" cy="4634660"/>
           </a:xfrm>
           <a:prstGeom prst="line">
             <a:avLst/>
@@ -5402,8 +5402,8 @@
         </p:nvCxnSpPr>
         <p:spPr>
           <a:xfrm flipH="1" flipV="1">
-            <a:off x="1161288" y="1281767"/>
-            <a:ext cx="6601968" cy="82295"/>
+            <a:off x="1173210" y="1623676"/>
+            <a:ext cx="7109544" cy="70712"/>
           </a:xfrm>
           <a:prstGeom prst="line">
             <a:avLst/>
@@ -5443,7 +5443,7 @@
         </p:nvCxnSpPr>
         <p:spPr>
           <a:xfrm flipH="1" flipV="1">
-            <a:off x="7680471" y="1063570"/>
+            <a:off x="8205271" y="1063570"/>
             <a:ext cx="20137" cy="4960249"/>
           </a:xfrm>
           <a:prstGeom prst="line">
@@ -5634,7 +5634,7 @@
         </p:nvSpPr>
         <p:spPr>
           <a:xfrm>
-            <a:off x="6362966" y="5336898"/>
+            <a:off x="7510179" y="5976769"/>
             <a:ext cx="1068080" cy="300082"/>
           </a:xfrm>
           <a:prstGeom prst="rect">
@@ -5669,7 +5669,7 @@
         </p:nvSpPr>
         <p:spPr>
           <a:xfrm>
-            <a:off x="7754112" y="5340467"/>
+            <a:off x="8192814" y="4957442"/>
             <a:ext cx="872369" cy="300082"/>
           </a:xfrm>
           <a:prstGeom prst="rect">
@@ -5712,7 +5712,7 @@
         </p:nvSpPr>
         <p:spPr>
           <a:xfrm>
-            <a:off x="798717" y="982261"/>
+            <a:off x="826547" y="1248807"/>
             <a:ext cx="872369" cy="300082"/>
           </a:xfrm>
           <a:prstGeom prst="rect">
@@ -5754,7 +5754,7 @@
         <p:spPr>
           <a:xfrm>
             <a:off x="1389887" y="5286832"/>
-            <a:ext cx="4729116" cy="556403"/>
+            <a:ext cx="6348475" cy="736987"/>
           </a:xfrm>
           <a:prstGeom prst="line">
             <a:avLst/>
@@ -5792,8 +5792,8 @@
         </p:nvCxnSpPr>
         <p:spPr>
           <a:xfrm>
-            <a:off x="845388" y="1571873"/>
-            <a:ext cx="544499" cy="3715523"/>
+            <a:off x="743465" y="671885"/>
+            <a:ext cx="646422" cy="4615511"/>
           </a:xfrm>
           <a:prstGeom prst="line">
             <a:avLst/>
@@ -5830,9 +5830,9 @@
           <p:nvPr/>
         </p:nvCxnSpPr>
         <p:spPr>
-          <a:xfrm flipH="1" flipV="1">
-            <a:off x="1234902" y="5823824"/>
-            <a:ext cx="4863965" cy="19689"/>
+          <a:xfrm flipH="1">
+            <a:off x="1199881" y="6023819"/>
+            <a:ext cx="6479790" cy="0"/>
           </a:xfrm>
           <a:prstGeom prst="line">
             <a:avLst/>
@@ -5872,7 +5872,7 @@
         </p:nvCxnSpPr>
         <p:spPr>
           <a:xfrm flipV="1">
-            <a:off x="6119003" y="4784785"/>
+            <a:off x="7717226" y="5015381"/>
             <a:ext cx="10069" cy="1009327"/>
           </a:xfrm>
           <a:prstGeom prst="line">
@@ -5911,7 +5911,7 @@
         </p:nvSpPr>
         <p:spPr>
           <a:xfrm>
-            <a:off x="5307037" y="4907824"/>
+            <a:off x="6915595" y="5237734"/>
             <a:ext cx="872369" cy="300082"/>
           </a:xfrm>
           <a:prstGeom prst="rect">
@@ -5999,8 +5999,8 @@
         </p:nvCxnSpPr>
         <p:spPr>
           <a:xfrm>
-            <a:off x="1111886" y="3285415"/>
-            <a:ext cx="5846755" cy="0"/>
+            <a:off x="1199881" y="3832464"/>
+            <a:ext cx="6652539" cy="959394"/>
           </a:xfrm>
           <a:prstGeom prst="straightConnector1">
             <a:avLst/>
@@ -6040,7 +6040,7 @@
         </p:nvSpPr>
         <p:spPr>
           <a:xfrm>
-            <a:off x="3197131" y="3282016"/>
+            <a:off x="6865994" y="4670547"/>
             <a:ext cx="872369" cy="300082"/>
           </a:xfrm>
           <a:prstGeom prst="rect">
@@ -6080,8 +6080,8 @@
         </p:nvSpPr>
         <p:spPr>
           <a:xfrm rot="4891438">
-            <a:off x="1094419" y="298756"/>
-            <a:ext cx="6292989" cy="6134339"/>
+            <a:off x="1045000" y="308498"/>
+            <a:ext cx="6347267" cy="6104882"/>
           </a:xfrm>
           <a:prstGeom prst="parallelogram">
             <a:avLst>
@@ -6136,8 +6136,8 @@
         </p:nvCxnSpPr>
         <p:spPr>
           <a:xfrm>
-            <a:off x="1400386" y="5273557"/>
-            <a:ext cx="6231165" cy="0"/>
+            <a:off x="1199881" y="3830396"/>
+            <a:ext cx="6345289" cy="904899"/>
           </a:xfrm>
           <a:prstGeom prst="straightConnector1">
             <a:avLst/>
@@ -6177,7 +6177,7 @@
         </p:nvSpPr>
         <p:spPr>
           <a:xfrm>
-            <a:off x="7103658" y="4959942"/>
+            <a:off x="6702148" y="4309893"/>
             <a:ext cx="872369" cy="300082"/>
           </a:xfrm>
           <a:prstGeom prst="rect">

</xml_diff>